<commit_message>
update references on ppt
</commit_message>
<xml_diff>
--- a/Project/Final/FinalPresentation_12062021.pptx
+++ b/Project/Final/FinalPresentation_12062021.pptx
@@ -4585,7 +4585,7 @@
         </p:spPr>
         <p:txBody>
           <a:bodyPr>
-            <a:normAutofit fontScale="70000" lnSpcReduction="20000"/>
+            <a:normAutofit fontScale="62500" lnSpcReduction="20000"/>
           </a:bodyPr>
           <a:lstStyle/>
           <a:p>
@@ -4993,11 +4993,31 @@
             <a:r>
               <a:rPr lang="en-US" dirty="0">
                 <a:effectLst/>
+              </a:rPr>
+              <a:t>G. Naik, B. Choudhury, Jung-Min, and Park, “IEEE 802.11bd &amp; 5G NR V2X: Evolution of Radio Access Technologies for V2X Communications,” </a:t>
+            </a:r>
+            <a:r>
+              <a:rPr lang="en-US" i="1" dirty="0">
+                <a:effectLst/>
+              </a:rPr>
+              <a:t>arXiv:1903.08391 [cs, math]</a:t>
+            </a:r>
+            <a:r>
+              <a:rPr lang="en-US" dirty="0">
+                <a:effectLst/>
+              </a:rPr>
+              <a:t>, Mar. 2019, Accessed: Dec. 04, 2021. [Online]. Available: </a:t>
+            </a:r>
+            <a:r>
+              <a:rPr lang="en-US" dirty="0">
+                <a:effectLst/>
                 <a:hlinkClick r:id="rId9"/>
               </a:rPr>
-              <a:t>https://github.com/bastibl/gr-ieee802-11</a:t>
-            </a:r>
-            <a:endParaRPr lang="en-US" dirty="0"/>
+              <a:t>http://arxiv.org/abs/1903.08391</a:t>
+            </a:r>
+            <a:endParaRPr lang="en-US" dirty="0">
+              <a:effectLst/>
+            </a:endParaRPr>
           </a:p>
           <a:p>
             <a:pPr marL="342900" indent="-342900">
@@ -5017,30 +5037,45 @@
               <a:rPr lang="en-US" dirty="0">
                 <a:effectLst/>
               </a:rPr>
-              <a:t>G. Naik, B. Choudhury, Jung-Min, and Park, “IEEE 802.11bd &amp; 5G NR V2X: Evolution of Radio Access Technologies for V2X Communications,” </a:t>
+              <a:t>K. Hafeez, L. Zhao, B. Ma, and J. Mark, “Performance Analysis and Enhancement of the DSRC for VANET’s Safety Applications,” </a:t>
             </a:r>
             <a:r>
               <a:rPr lang="en-US" i="1" dirty="0">
                 <a:effectLst/>
               </a:rPr>
-              <a:t>arXiv:1903.08391 [cs, math]</a:t>
+              <a:t>Vehicular Technology, IEEE Transactions on</a:t>
             </a:r>
             <a:r>
               <a:rPr lang="en-US" dirty="0">
                 <a:effectLst/>
               </a:rPr>
-              <a:t>, Mar. 2019, Accessed: Dec. 04, 2021. [Online]. Available: </a:t>
+              <a:t>, vol. 62, pp. 3069–3083, Sep. 2013, </a:t>
+            </a:r>
+            <a:r>
+              <a:rPr lang="en-US" dirty="0" err="1">
+                <a:effectLst/>
+              </a:rPr>
+              <a:t>doi</a:t>
             </a:r>
             <a:r>
               <a:rPr lang="en-US" dirty="0">
                 <a:effectLst/>
+              </a:rPr>
+              <a:t>: </a:t>
+            </a:r>
+            <a:r>
+              <a:rPr lang="en-US" dirty="0">
+                <a:effectLst/>
                 <a:hlinkClick r:id="rId10"/>
               </a:rPr>
-              <a:t>http://arxiv.org/abs/1903.08391</a:t>
-            </a:r>
-            <a:endParaRPr lang="en-US" dirty="0">
-              <a:effectLst/>
-            </a:endParaRPr>
+              <a:t>10.1109/TVT.2013.2251374</a:t>
+            </a:r>
+            <a:r>
+              <a:rPr lang="en-US" dirty="0">
+                <a:effectLst/>
+              </a:rPr>
+              <a:t>.</a:t>
+            </a:r>
           </a:p>
           <a:p>
             <a:pPr marL="342900" indent="-342900">
@@ -5060,19 +5095,55 @@
               <a:rPr lang="en-US" dirty="0">
                 <a:effectLst/>
               </a:rPr>
-              <a:t>K. Hafeez, L. Zhao, B. Ma, and J. Mark, “Performance Analysis and Enhancement of the DSRC for VANET’s Safety Applications,” </a:t>
+              <a:t>R. Molina-</a:t>
+            </a:r>
+            <a:r>
+              <a:rPr lang="en-US" dirty="0" err="1">
+                <a:effectLst/>
+              </a:rPr>
+              <a:t>Masegosa</a:t>
+            </a:r>
+            <a:r>
+              <a:rPr lang="en-US" dirty="0">
+                <a:effectLst/>
+              </a:rPr>
+              <a:t> and J. </a:t>
+            </a:r>
+            <a:r>
+              <a:rPr lang="en-US" dirty="0" err="1">
+                <a:effectLst/>
+              </a:rPr>
+              <a:t>Gozálvez</a:t>
+            </a:r>
+            <a:r>
+              <a:rPr lang="en-US" dirty="0">
+                <a:effectLst/>
+              </a:rPr>
+              <a:t>, “LTE-V for </a:t>
+            </a:r>
+            <a:r>
+              <a:rPr lang="en-US" dirty="0" err="1">
+                <a:effectLst/>
+              </a:rPr>
+              <a:t>Sidelink</a:t>
+            </a:r>
+            <a:r>
+              <a:rPr lang="en-US" dirty="0">
+                <a:effectLst/>
+              </a:rPr>
+              <a:t> 5G V2X Vehicular Communications: A New 5G Technology for Short-Range Vehicle-to-Everything Communications,” </a:t>
             </a:r>
             <a:r>
               <a:rPr lang="en-US" i="1" dirty="0">
                 <a:effectLst/>
               </a:rPr>
-              <a:t>Vehicular Technology, IEEE Transactions on</a:t>
+              <a:t>IEEE Vehicular Technology Magazine</a:t>
             </a:r>
             <a:r>
               <a:rPr lang="en-US" dirty="0">
                 <a:effectLst/>
               </a:rPr>
-              <a:t>, vol. 62, pp. 3069–3083, Sep. 2013, </a:t>
+              <a:t>, 2017, </a:t>
             </a:r>
             <a:r>
               <a:rPr lang="en-US" dirty="0" err="1">
@@ -5090,100 +5161,6 @@
               <a:rPr lang="en-US" dirty="0">
                 <a:effectLst/>
                 <a:hlinkClick r:id="rId11"/>
-              </a:rPr>
-              <a:t>10.1109/TVT.2013.2251374</a:t>
-            </a:r>
-            <a:r>
-              <a:rPr lang="en-US" dirty="0">
-                <a:effectLst/>
-              </a:rPr>
-              <a:t>.</a:t>
-            </a:r>
-          </a:p>
-          <a:p>
-            <a:pPr marL="342900" indent="-342900">
-              <a:lnSpc>
-                <a:spcPct val="110000"/>
-              </a:lnSpc>
-              <a:spcBef>
-                <a:spcPts val="0"/>
-              </a:spcBef>
-              <a:spcAft>
-                <a:spcPts val="0"/>
-              </a:spcAft>
-              <a:buFont typeface="+mj-lt"/>
-              <a:buAutoNum type="arabicPeriod"/>
-            </a:pPr>
-            <a:r>
-              <a:rPr lang="en-US" dirty="0">
-                <a:effectLst/>
-              </a:rPr>
-              <a:t>R. Molina-</a:t>
-            </a:r>
-            <a:r>
-              <a:rPr lang="en-US" dirty="0" err="1">
-                <a:effectLst/>
-              </a:rPr>
-              <a:t>Masegosa</a:t>
-            </a:r>
-            <a:r>
-              <a:rPr lang="en-US" dirty="0">
-                <a:effectLst/>
-              </a:rPr>
-              <a:t> and J. </a:t>
-            </a:r>
-            <a:r>
-              <a:rPr lang="en-US" dirty="0" err="1">
-                <a:effectLst/>
-              </a:rPr>
-              <a:t>Gozálvez</a:t>
-            </a:r>
-            <a:r>
-              <a:rPr lang="en-US" dirty="0">
-                <a:effectLst/>
-              </a:rPr>
-              <a:t>, “LTE-V for </a:t>
-            </a:r>
-            <a:r>
-              <a:rPr lang="en-US" dirty="0" err="1">
-                <a:effectLst/>
-              </a:rPr>
-              <a:t>Sidelink</a:t>
-            </a:r>
-            <a:r>
-              <a:rPr lang="en-US" dirty="0">
-                <a:effectLst/>
-              </a:rPr>
-              <a:t> 5G V2X Vehicular Communications: A New 5G Technology for Short-Range Vehicle-to-Everything Communications,” </a:t>
-            </a:r>
-            <a:r>
-              <a:rPr lang="en-US" i="1" dirty="0">
-                <a:effectLst/>
-              </a:rPr>
-              <a:t>IEEE Vehicular Technology Magazine</a:t>
-            </a:r>
-            <a:r>
-              <a:rPr lang="en-US" dirty="0">
-                <a:effectLst/>
-              </a:rPr>
-              <a:t>, 2017, </a:t>
-            </a:r>
-            <a:r>
-              <a:rPr lang="en-US" dirty="0" err="1">
-                <a:effectLst/>
-              </a:rPr>
-              <a:t>doi</a:t>
-            </a:r>
-            <a:r>
-              <a:rPr lang="en-US" dirty="0">
-                <a:effectLst/>
-              </a:rPr>
-              <a:t>: </a:t>
-            </a:r>
-            <a:r>
-              <a:rPr lang="en-US" dirty="0">
-                <a:effectLst/>
-                <a:hlinkClick r:id="rId12"/>
               </a:rPr>
               <a:t>10.1109/MVT.2017.2752798</a:t>
             </a:r>
@@ -5238,16 +5215,105 @@
             <a:r>
               <a:rPr lang="en-US" dirty="0">
                 <a:effectLst/>
+                <a:hlinkClick r:id="rId12"/>
+              </a:rPr>
+              <a:t>https://website.localhost.com/blog/5g-v2x-and-autonomous-vehicles</a:t>
+            </a:r>
+            <a:r>
+              <a:rPr lang="en-US" dirty="0">
+                <a:effectLst/>
+              </a:rPr>
+              <a:t> (accessed Dec. 05, 2021).</a:t>
+            </a:r>
+          </a:p>
+          <a:p>
+            <a:pPr marL="342900" indent="-342900">
+              <a:lnSpc>
+                <a:spcPct val="110000"/>
+              </a:lnSpc>
+              <a:buFont typeface="+mj-lt"/>
+              <a:buAutoNum type="arabicPeriod"/>
+            </a:pPr>
+            <a:r>
+              <a:rPr lang="en-US" dirty="0" err="1">
+                <a:effectLst/>
+              </a:rPr>
+              <a:t>Github</a:t>
+            </a:r>
+            <a:r>
+              <a:rPr lang="en-US" dirty="0">
+                <a:effectLst/>
+              </a:rPr>
+              <a:t> Repositories</a:t>
+            </a:r>
+          </a:p>
+          <a:p>
+            <a:pPr marL="666900" lvl="1" indent="-342900">
+              <a:lnSpc>
+                <a:spcPct val="110000"/>
+              </a:lnSpc>
+              <a:buFont typeface="+mj-lt"/>
+              <a:buAutoNum type="arabicPeriod"/>
+            </a:pPr>
+            <a:r>
+              <a:rPr lang="en-US" dirty="0">
+                <a:effectLst/>
                 <a:hlinkClick r:id="rId13"/>
               </a:rPr>
-              <a:t>https://website.localhost.com/blog/5g-v2x-and-autonomous-vehicles</a:t>
-            </a:r>
+              <a:t>https://github.com/bastibl/gr-ieee802-11</a:t>
+            </a:r>
+            <a:endParaRPr lang="en-US" dirty="0"/>
+          </a:p>
+          <a:p>
+            <a:pPr marL="666900" lvl="1" indent="-342900">
+              <a:lnSpc>
+                <a:spcPct val="110000"/>
+              </a:lnSpc>
+              <a:buFont typeface="+mj-lt"/>
+              <a:buAutoNum type="arabicPeriod"/>
+            </a:pPr>
             <a:r>
               <a:rPr lang="en-US" dirty="0">
                 <a:effectLst/>
-              </a:rPr>
-              <a:t> (accessed Dec. 05, 2021).</a:t>
-            </a:r>
+                <a:hlinkClick r:id="rId14"/>
+              </a:rPr>
+              <a:t>https://github.com/ipovaric/gr-ieee802-11</a:t>
+            </a:r>
+            <a:endParaRPr lang="en-US" dirty="0">
+              <a:effectLst/>
+              <a:hlinkClick r:id="rId15"/>
+            </a:endParaRPr>
+          </a:p>
+          <a:p>
+            <a:pPr marL="666900" lvl="1" indent="-342900">
+              <a:lnSpc>
+                <a:spcPct val="110000"/>
+              </a:lnSpc>
+              <a:buFont typeface="+mj-lt"/>
+              <a:buAutoNum type="arabicPeriod"/>
+            </a:pPr>
+            <a:r>
+              <a:rPr lang="en-US" dirty="0">
+                <a:effectLst/>
+                <a:hlinkClick r:id="rId15"/>
+              </a:rPr>
+              <a:t>https://github.com/ipovaric/wireless_comm_lab</a:t>
+            </a:r>
+            <a:endParaRPr lang="en-US" dirty="0">
+              <a:effectLst/>
+            </a:endParaRPr>
+          </a:p>
+          <a:p>
+            <a:pPr marL="666900" lvl="1" indent="-342900">
+              <a:lnSpc>
+                <a:spcPct val="110000"/>
+              </a:lnSpc>
+              <a:buFont typeface="+mj-lt"/>
+              <a:buAutoNum type="arabicPeriod"/>
+            </a:pPr>
+            <a:endParaRPr lang="en-US" dirty="0">
+              <a:effectLst/>
+            </a:endParaRPr>
           </a:p>
           <a:p>
             <a:pPr marL="342900" indent="-342900">
@@ -6210,8 +6276,8 @@
           </a:p>
         </p:txBody>
       </p:sp>
-      <mc:AlternateContent xmlns:mc="http://schemas.openxmlformats.org/markup-compatibility/2006">
-        <mc:Choice xmlns:a14="http://schemas.microsoft.com/office/drawing/2010/main" Requires="a14">
+      <mc:AlternateContent xmlns:mc="http://schemas.openxmlformats.org/markup-compatibility/2006" xmlns:a14="http://schemas.microsoft.com/office/drawing/2010/main">
+        <mc:Choice Requires="a14">
           <p:sp>
             <p:nvSpPr>
               <p:cNvPr id="3" name="Content Placeholder 2">
@@ -6453,7 +6519,7 @@
             </p:txBody>
           </p:sp>
         </mc:Choice>
-        <mc:Fallback>
+        <mc:Fallback xmlns="">
           <p:sp>
             <p:nvSpPr>
               <p:cNvPr id="3" name="Content Placeholder 2">
@@ -7634,7 +7700,7 @@
             </a:r>
             <a:r>
               <a:rPr lang="en-US" dirty="0"/>
-              <a:t> repos related to the papers were available at [7] and [8], partially supported by the open-source community and the authors of the previous studies</a:t>
+              <a:t> repos related to the papers were available at [7], supported by the open-source community and the authors of the previous studies</a:t>
             </a:r>
           </a:p>
           <a:p>

</xml_diff>